<commit_message>
make the code compatible for windows
</commit_message>
<xml_diff>
--- a/Tutourial for OpenLPT.pptx
+++ b/Tutourial for OpenLPT.pptx
@@ -5,10 +5,10 @@
     <p:sldMasterId id="2147483648" r:id="rId1"/>
   </p:sldMasterIdLst>
   <p:notesMasterIdLst>
-    <p:notesMasterId r:id="rId9"/>
+    <p:notesMasterId r:id="rId11"/>
   </p:notesMasterIdLst>
   <p:handoutMasterIdLst>
-    <p:handoutMasterId r:id="rId10"/>
+    <p:handoutMasterId r:id="rId12"/>
   </p:handoutMasterIdLst>
   <p:sldIdLst>
     <p:sldId id="256" r:id="rId3"/>
@@ -17,6 +17,8 @@
     <p:sldId id="259" r:id="rId6"/>
     <p:sldId id="260" r:id="rId7"/>
     <p:sldId id="261" r:id="rId8"/>
+    <p:sldId id="262" r:id="rId9"/>
+    <p:sldId id="263" r:id="rId10"/>
   </p:sldIdLst>
   <p:sldSz cx="9144000" cy="6858000" type="screen4x3"/>
   <p:notesSz cx="7103745" cy="10234295"/>
@@ -4956,6 +4958,310 @@
           </a:p>
         </p:txBody>
       </p:sp>
+    </p:spTree>
+  </p:cSld>
+  <p:clrMapOvr>
+    <a:masterClrMapping/>
+  </p:clrMapOvr>
+</p:sld>
+</file>
+
+<file path=ppt/slides/slide7.xml><?xml version="1.0" encoding="utf-8"?>
+<p:sld xmlns:a="http://schemas.openxmlformats.org/drawingml/2006/main" xmlns:r="http://schemas.openxmlformats.org/officeDocument/2006/relationships" xmlns:p="http://schemas.openxmlformats.org/presentationml/2006/main">
+  <p:cSld>
+    <p:spTree>
+      <p:nvGrpSpPr>
+        <p:cNvPr id="1" name=""/>
+        <p:cNvGrpSpPr/>
+        <p:nvPr/>
+      </p:nvGrpSpPr>
+      <p:grpSpPr/>
+      <p:sp>
+        <p:nvSpPr>
+          <p:cNvPr id="2" name="Title 1"/>
+          <p:cNvSpPr>
+            <a:spLocks noGrp="1"/>
+          </p:cNvSpPr>
+          <p:nvPr>
+            <p:ph type="title"/>
+          </p:nvPr>
+        </p:nvSpPr>
+        <p:spPr/>
+        <p:txBody>
+          <a:bodyPr/>
+          <a:p>
+            <a:r>
+              <a:rPr lang="" altLang="en-US"/>
+              <a:t>Install gcc</a:t>
+            </a:r>
+            <a:endParaRPr lang="" altLang="en-US"/>
+          </a:p>
+        </p:txBody>
+      </p:sp>
+      <p:sp>
+        <p:nvSpPr>
+          <p:cNvPr id="3" name="Content Placeholder 2"/>
+          <p:cNvSpPr>
+            <a:spLocks noGrp="1"/>
+          </p:cNvSpPr>
+          <p:nvPr>
+            <p:ph idx="1"/>
+          </p:nvPr>
+        </p:nvSpPr>
+        <p:spPr/>
+        <p:txBody>
+          <a:bodyPr/>
+          <a:p>
+            <a:r>
+              <a:rPr lang="" altLang="en-US" sz="2800"/>
+              <a:t>Windows: </a:t>
+            </a:r>
+            <a:endParaRPr lang="" altLang="en-US" sz="2800"/>
+          </a:p>
+          <a:p>
+            <a:pPr lvl="1"/>
+            <a:r>
+              <a:rPr lang="" altLang="en-US" sz="2400"/>
+              <a:t>https://cygwin.com/install.html</a:t>
+            </a:r>
+            <a:endParaRPr lang="" altLang="en-US" sz="2400"/>
+          </a:p>
+          <a:p>
+            <a:pPr lvl="1"/>
+            <a:r>
+              <a:rPr lang="" sz="2400"/>
+              <a:t>download the cygwin installer to a folder (remember this folder)</a:t>
+            </a:r>
+            <a:endParaRPr lang="" sz="2400"/>
+          </a:p>
+          <a:p>
+            <a:pPr lvl="1"/>
+            <a:r>
+              <a:rPr lang="" sz="2400"/>
+              <a:t>install cygwin.</a:t>
+            </a:r>
+            <a:endParaRPr lang="" sz="2400"/>
+          </a:p>
+          <a:p>
+            <a:pPr lvl="1"/>
+            <a:r>
+              <a:rPr lang="" sz="2400"/>
+              <a:t>run cmd, and go to the folder you download the cygwin installer, and run the command:</a:t>
+            </a:r>
+            <a:endParaRPr lang="" sz="2400"/>
+          </a:p>
+          <a:p>
+            <a:pPr lvl="2"/>
+            <a:r>
+              <a:rPr lang="" sz="2000"/>
+              <a:t>setup-x86_64.exe -q -P wget -P gcc-g++ -P make -P diffutils -P libmpfr-devel -P libgmp-devel -P libmpc-devel</a:t>
+            </a:r>
+            <a:endParaRPr lang="" sz="2000"/>
+          </a:p>
+          <a:p>
+            <a:pPr lvl="1"/>
+            <a:r>
+              <a:rPr lang="" sz="2000"/>
+              <a:t>to install required packages.</a:t>
+            </a:r>
+            <a:endParaRPr lang="" sz="2000"/>
+          </a:p>
+          <a:p>
+            <a:pPr lvl="1"/>
+            <a:r>
+              <a:rPr lang="en-US" sz="2000">
+                <a:sym typeface="+mn-ea"/>
+              </a:rPr>
+              <a:t>Add C:\cygwin64\bin to your system path.</a:t>
+            </a:r>
+            <a:endParaRPr lang="en-US" sz="2000">
+              <a:sym typeface="+mn-ea"/>
+            </a:endParaRPr>
+          </a:p>
+          <a:p>
+            <a:pPr lvl="2"/>
+            <a:r>
+              <a:rPr lang="" sz="1600"/>
+              <a:t>Search: Edit the system environment variables &gt; Environment Variables &gt; Path &gt; edit &gt; add  “</a:t>
+            </a:r>
+            <a:r>
+              <a:rPr lang="en-US" sz="1600">
+                <a:sym typeface="+mn-ea"/>
+              </a:rPr>
+              <a:t>C:\cygwin64\bin</a:t>
+            </a:r>
+            <a:r>
+              <a:rPr lang="" sz="1600"/>
+              <a:t>”</a:t>
+            </a:r>
+            <a:endParaRPr lang="" sz="1600"/>
+          </a:p>
+        </p:txBody>
+      </p:sp>
+    </p:spTree>
+  </p:cSld>
+  <p:clrMapOvr>
+    <a:masterClrMapping/>
+  </p:clrMapOvr>
+</p:sld>
+</file>
+
+<file path=ppt/slides/slide8.xml><?xml version="1.0" encoding="utf-8"?>
+<p:sld xmlns:a="http://schemas.openxmlformats.org/drawingml/2006/main" xmlns:r="http://schemas.openxmlformats.org/officeDocument/2006/relationships" xmlns:p="http://schemas.openxmlformats.org/presentationml/2006/main">
+  <p:cSld>
+    <p:spTree>
+      <p:nvGrpSpPr>
+        <p:cNvPr id="1" name=""/>
+        <p:cNvGrpSpPr/>
+        <p:nvPr/>
+      </p:nvGrpSpPr>
+      <p:grpSpPr/>
+      <p:sp>
+        <p:nvSpPr>
+          <p:cNvPr id="2" name="Title 1"/>
+          <p:cNvSpPr>
+            <a:spLocks noGrp="1"/>
+          </p:cNvSpPr>
+          <p:nvPr>
+            <p:ph type="title"/>
+          </p:nvPr>
+        </p:nvSpPr>
+        <p:spPr/>
+        <p:txBody>
+          <a:bodyPr/>
+          <a:p>
+            <a:r>
+              <a:rPr lang="" altLang="en-US"/>
+              <a:t>Build the code</a:t>
+            </a:r>
+            <a:endParaRPr lang="" altLang="en-US"/>
+          </a:p>
+        </p:txBody>
+      </p:sp>
+      <p:sp>
+        <p:nvSpPr>
+          <p:cNvPr id="3" name="Content Placeholder 2"/>
+          <p:cNvSpPr>
+            <a:spLocks noGrp="1"/>
+          </p:cNvSpPr>
+          <p:nvPr>
+            <p:ph idx="1"/>
+          </p:nvPr>
+        </p:nvSpPr>
+        <p:spPr/>
+        <p:txBody>
+          <a:bodyPr/>
+          <a:p>
+            <a:r>
+              <a:rPr lang="" altLang="en-US"/>
+              <a:t>After installing gcc, then the code can be built.</a:t>
+            </a:r>
+            <a:endParaRPr lang="" altLang="en-US"/>
+          </a:p>
+          <a:p>
+            <a:pPr lvl="1"/>
+            <a:r>
+              <a:rPr lang="" altLang="en-US" sz="2800"/>
+              <a:t>click the drop-down list</a:t>
+            </a:r>
+            <a:r>
+              <a:rPr lang="" altLang="en-US"/>
+              <a:t> from</a:t>
+            </a:r>
+            <a:endParaRPr lang="" altLang="en-US"/>
+          </a:p>
+          <a:p>
+            <a:pPr lvl="1"/>
+            <a:r>
+              <a:rPr lang="en-US" altLang="en-US">
+                <a:sym typeface="+mn-ea"/>
+              </a:rPr>
+              <a:t>For windows system, </a:t>
+            </a:r>
+            <a:r>
+              <a:rPr lang="" altLang="en-US">
+                <a:sym typeface="+mn-ea"/>
+              </a:rPr>
+              <a:t>select Release_windows</a:t>
+            </a:r>
+            <a:endParaRPr lang="" altLang="en-US">
+              <a:sym typeface="+mn-ea"/>
+            </a:endParaRPr>
+          </a:p>
+          <a:p>
+            <a:pPr lvl="1"/>
+            <a:r>
+              <a:rPr lang="" altLang="en-US">
+                <a:sym typeface="+mn-ea"/>
+              </a:rPr>
+              <a:t>For linux system, select Release</a:t>
+            </a:r>
+            <a:endParaRPr lang="" altLang="en-US"/>
+          </a:p>
+          <a:p>
+            <a:r>
+              <a:rPr lang="" altLang="en-US"/>
+              <a:t> Wait the building process to be finished.</a:t>
+            </a:r>
+            <a:endParaRPr lang="" altLang="en-US"/>
+          </a:p>
+          <a:p>
+            <a:r>
+              <a:rPr lang="" altLang="en-US"/>
+              <a:t>The executable file for ShakeTheBox will show up under the folder:</a:t>
+            </a:r>
+            <a:endParaRPr lang="" altLang="en-US"/>
+          </a:p>
+          <a:p>
+            <a:pPr lvl="1"/>
+            <a:r>
+              <a:rPr lang="" altLang="en-US" sz="2400"/>
+              <a:t>[folder of the ShakeTheBox code]/Release_windows</a:t>
+            </a:r>
+            <a:endParaRPr lang="" altLang="en-US" sz="2400"/>
+          </a:p>
+          <a:p>
+            <a:pPr lvl="1"/>
+            <a:r>
+              <a:rPr lang="" altLang="en-US" sz="2400"/>
+              <a:t>or </a:t>
+            </a:r>
+            <a:r>
+              <a:rPr lang="en-US" altLang="en-US" sz="2400">
+                <a:sym typeface="+mn-ea"/>
+              </a:rPr>
+              <a:t>[folder of the ShakeTheBox code]/Release</a:t>
+            </a:r>
+            <a:endParaRPr lang="en-US" altLang="en-US" sz="2400">
+              <a:sym typeface="+mn-ea"/>
+            </a:endParaRPr>
+          </a:p>
+        </p:txBody>
+      </p:sp>
+      <p:pic>
+        <p:nvPicPr>
+          <p:cNvPr id="4" name="Picture 3"/>
+          <p:cNvPicPr>
+            <a:picLocks noChangeAspect="1"/>
+          </p:cNvPicPr>
+          <p:nvPr/>
+        </p:nvPicPr>
+        <p:blipFill>
+          <a:blip r:embed="rId1"/>
+          <a:stretch>
+            <a:fillRect/>
+          </a:stretch>
+        </p:blipFill>
+        <p:spPr>
+          <a:xfrm>
+            <a:off x="6005830" y="2306320"/>
+            <a:ext cx="505460" cy="360680"/>
+          </a:xfrm>
+          <a:prstGeom prst="rect">
+            <a:avLst/>
+          </a:prstGeom>
+        </p:spPr>
+      </p:pic>
     </p:spTree>
   </p:cSld>
   <p:clrMapOvr>

</xml_diff>

<commit_message>
Update tutorial for chaning the compiler
</commit_message>
<xml_diff>
--- a/Tutourial for OpenLPT.pptx
+++ b/Tutourial for OpenLPT.pptx
@@ -5,26 +5,26 @@
     <p:sldMasterId id="2147483648" r:id="rId1"/>
   </p:sldMasterIdLst>
   <p:notesMasterIdLst>
-    <p:notesMasterId r:id="rId14"/>
+    <p:notesMasterId r:id="rId13"/>
   </p:notesMasterIdLst>
   <p:handoutMasterIdLst>
-    <p:handoutMasterId r:id="rId15"/>
+    <p:handoutMasterId r:id="rId14"/>
   </p:handoutMasterIdLst>
   <p:sldIdLst>
-    <p:sldId id="256" r:id="rId3"/>
-    <p:sldId id="257" r:id="rId4"/>
-    <p:sldId id="258" r:id="rId5"/>
-    <p:sldId id="259" r:id="rId6"/>
-    <p:sldId id="260" r:id="rId7"/>
-    <p:sldId id="261" r:id="rId8"/>
-    <p:sldId id="262" r:id="rId9"/>
-    <p:sldId id="267" r:id="rId10"/>
-    <p:sldId id="263" r:id="rId11"/>
-    <p:sldId id="264" r:id="rId12"/>
-    <p:sldId id="265" r:id="rId13"/>
+    <p:sldId id="256" r:id="rId2"/>
+    <p:sldId id="257" r:id="rId3"/>
+    <p:sldId id="258" r:id="rId4"/>
+    <p:sldId id="259" r:id="rId5"/>
+    <p:sldId id="260" r:id="rId6"/>
+    <p:sldId id="261" r:id="rId7"/>
+    <p:sldId id="262" r:id="rId8"/>
+    <p:sldId id="267" r:id="rId9"/>
+    <p:sldId id="263" r:id="rId10"/>
+    <p:sldId id="264" r:id="rId11"/>
+    <p:sldId id="265" r:id="rId12"/>
   </p:sldIdLst>
   <p:sldSz cx="9144000" cy="6858000" type="screen4x3"/>
-  <p:notesSz cx="7103745" cy="10234295"/>
+  <p:notesSz cx="7104063" cy="10234613"/>
   <p:defaultTextStyle>
     <a:defPPr>
       <a:defRPr lang="zh-CN"/>
@@ -120,6 +120,22 @@
       </a:defRPr>
     </a:lvl9pPr>
   </p:defaultTextStyle>
+  <p:extLst>
+    <p:ext uri="{EFAFB233-063F-42B5-8137-9DF3F51BA10A}">
+      <p15:sldGuideLst xmlns:p15="http://schemas.microsoft.com/office/powerpoint/2012/main">
+        <p15:guide id="1" orient="horz" pos="2160">
+          <p15:clr>
+            <a:srgbClr val="A4A3A4"/>
+          </p15:clr>
+        </p15:guide>
+        <p15:guide id="2" pos="2880">
+          <p15:clr>
+            <a:srgbClr val="A4A3A4"/>
+          </p15:clr>
+        </p15:guide>
+      </p15:sldGuideLst>
+    </p:ext>
+  </p:extLst>
 </p:presentation>
 </file>
 
@@ -205,6 +221,7 @@
           <a:p>
             <a:fld id="{0F9B84EA-7D68-4D60-9CB1-D50884785D1C}" type="datetimeFigureOut">
               <a:rPr lang="zh-CN" altLang="en-US" smtClean="0"/>
+              <a:t>2020/6/11</a:t>
             </a:fld>
             <a:endParaRPr lang="zh-CN" altLang="en-US"/>
           </a:p>
@@ -270,6 +287,7 @@
           <a:p>
             <a:fld id="{8D4E0FC9-F1F8-4FAE-9988-3BA365CFD46F}" type="slidenum">
               <a:rPr lang="zh-CN" altLang="en-US" smtClean="0"/>
+              <a:t>‹#›</a:t>
             </a:fld>
             <a:endParaRPr lang="zh-CN" altLang="en-US"/>
           </a:p>
@@ -363,6 +381,7 @@
           <a:p>
             <a:fld id="{D6C8D182-E4C8-4120-9249-FC9774456FFA}" type="datetimeFigureOut">
               <a:rPr lang="zh-CN" altLang="en-US" smtClean="0"/>
+              <a:t>2020/6/11</a:t>
             </a:fld>
             <a:endParaRPr lang="zh-CN" altLang="en-US"/>
           </a:p>
@@ -429,7 +448,6 @@
               <a:rPr lang="zh-CN" altLang="en-US"/>
               <a:t>编辑母版文本样式</a:t>
             </a:r>
-            <a:endParaRPr lang="zh-CN" altLang="en-US"/>
           </a:p>
           <a:p>
             <a:pPr lvl="1"/>
@@ -437,7 +455,6 @@
               <a:rPr lang="zh-CN" altLang="en-US"/>
               <a:t>第二级</a:t>
             </a:r>
-            <a:endParaRPr lang="zh-CN" altLang="en-US"/>
           </a:p>
           <a:p>
             <a:pPr lvl="2"/>
@@ -445,7 +462,6 @@
               <a:rPr lang="zh-CN" altLang="en-US"/>
               <a:t>第三级</a:t>
             </a:r>
-            <a:endParaRPr lang="zh-CN" altLang="en-US"/>
           </a:p>
           <a:p>
             <a:pPr lvl="3"/>
@@ -453,7 +469,6 @@
               <a:rPr lang="zh-CN" altLang="en-US"/>
               <a:t>第四级</a:t>
             </a:r>
-            <a:endParaRPr lang="zh-CN" altLang="en-US"/>
           </a:p>
           <a:p>
             <a:pPr lvl="4"/>
@@ -461,7 +476,6 @@
               <a:rPr lang="zh-CN" altLang="en-US"/>
               <a:t>第五级</a:t>
             </a:r>
-            <a:endParaRPr lang="zh-CN" altLang="en-US"/>
           </a:p>
         </p:txBody>
       </p:sp>
@@ -525,6 +539,7 @@
           <a:p>
             <a:fld id="{85D0DACE-38E0-42D2-9336-2B707D34BC6D}" type="slidenum">
               <a:rPr lang="zh-CN" altLang="en-US" smtClean="0"/>
+              <a:t>‹#›</a:t>
             </a:fld>
             <a:endParaRPr lang="zh-CN" altLang="en-US"/>
           </a:p>
@@ -629,7 +644,7 @@
 </file>
 
 <file path=ppt/slideLayouts/slideLayout1.xml><?xml version="1.0" encoding="utf-8"?>
-<p:sldLayout xmlns:a="http://schemas.openxmlformats.org/drawingml/2006/main" xmlns:r="http://schemas.openxmlformats.org/officeDocument/2006/relationships" xmlns:p="http://schemas.openxmlformats.org/presentationml/2006/main" type="title" preserve="1" showMasterSp="0">
+<p:sldLayout xmlns:a="http://schemas.openxmlformats.org/drawingml/2006/main" xmlns:r="http://schemas.openxmlformats.org/officeDocument/2006/relationships" xmlns:p="http://schemas.openxmlformats.org/presentationml/2006/main" showMasterSp="0" type="title" preserve="1">
   <p:cSld name="Title Slide">
     <p:bg>
       <p:bgPr>
@@ -898,7 +913,6 @@
               <a:rPr lang="en-US" altLang="zh-CN" strike="noStrike" noProof="0" smtClean="0"/>
               <a:t>Click to edit Master title style</a:t>
             </a:r>
-            <a:endParaRPr lang="en-US" altLang="zh-CN" strike="noStrike" noProof="0" smtClean="0"/>
           </a:p>
         </p:txBody>
       </p:sp>
@@ -937,7 +951,6 @@
               <a:rPr lang="en-US" altLang="zh-CN" strike="noStrike" noProof="0" smtClean="0"/>
               <a:t>Click to edit Master subtitle style</a:t>
             </a:r>
-            <a:endParaRPr lang="en-US" altLang="zh-CN" strike="noStrike" noProof="0" smtClean="0"/>
           </a:p>
         </p:txBody>
       </p:sp>
@@ -1003,6 +1016,7 @@
           <a:p>
             <a:fld id="{760FBDFE-C587-4B4C-A407-44438C67B59E}" type="datetimeFigureOut">
               <a:rPr lang="zh-CN" altLang="en-US" smtClean="0"/>
+              <a:t>2020/6/11</a:t>
             </a:fld>
             <a:endParaRPr lang="zh-CN" altLang="en-US"/>
           </a:p>
@@ -1146,7 +1160,6 @@
               <a:rPr lang="en-US" strike="noStrike" noProof="1" smtClean="0"/>
               <a:t>Click to edit Master text styles</a:t>
             </a:r>
-            <a:endParaRPr lang="en-US" strike="noStrike" noProof="1" smtClean="0"/>
           </a:p>
           <a:p>
             <a:pPr lvl="1" fontAlgn="base"/>
@@ -1154,7 +1167,6 @@
               <a:rPr lang="en-US" strike="noStrike" noProof="1" smtClean="0"/>
               <a:t>Second level</a:t>
             </a:r>
-            <a:endParaRPr lang="en-US" strike="noStrike" noProof="1" smtClean="0"/>
           </a:p>
           <a:p>
             <a:pPr lvl="2" fontAlgn="base"/>
@@ -1162,7 +1174,6 @@
               <a:rPr lang="en-US" strike="noStrike" noProof="1" smtClean="0"/>
               <a:t>Third level</a:t>
             </a:r>
-            <a:endParaRPr lang="en-US" strike="noStrike" noProof="1" smtClean="0"/>
           </a:p>
           <a:p>
             <a:pPr lvl="3" fontAlgn="base"/>
@@ -1170,7 +1181,6 @@
               <a:rPr lang="en-US" strike="noStrike" noProof="1" smtClean="0"/>
               <a:t>Fourth level</a:t>
             </a:r>
-            <a:endParaRPr lang="en-US" strike="noStrike" noProof="1" smtClean="0"/>
           </a:p>
           <a:p>
             <a:pPr lvl="4" fontAlgn="base"/>
@@ -1208,6 +1218,7 @@
         </p:spPr>
         <p:txBody>
           <a:bodyPr vert="horz" wrap="square" lIns="91440" tIns="45720" rIns="91440" bIns="45720" numCol="1" anchor="t" anchorCtr="0" compatLnSpc="1"/>
+          <a:lstStyle/>
           <a:p>
             <a:pPr lvl="0" fontAlgn="auto"/>
             <a:endParaRPr lang="en-US" strike="noStrike" noProof="1"/>
@@ -1232,6 +1243,7 @@
         </p:spPr>
         <p:txBody>
           <a:bodyPr/>
+          <a:lstStyle/>
           <a:p>
             <a:pPr lvl="0" fontAlgn="auto"/>
             <a:endParaRPr lang="en-US" strike="noStrike" noProof="1"/>
@@ -1264,6 +1276,7 @@
         </p:spPr>
         <p:txBody>
           <a:bodyPr vert="horz" wrap="square" lIns="91440" tIns="45720" rIns="91440" bIns="45720" numCol="1" anchor="t" anchorCtr="0" compatLnSpc="1"/>
+          <a:lstStyle/>
           <a:p>
             <a:pPr lvl="0" fontAlgn="auto"/>
             <a:fld id="{9A0DB2DC-4C9A-4742-B13C-FB6460FD3503}" type="slidenum">
@@ -1272,6 +1285,7 @@
                 <a:ea typeface="+mn-ea"/>
                 <a:cs typeface="+mn-cs"/>
               </a:rPr>
+              <a:t>‹#›</a:t>
             </a:fld>
             <a:endParaRPr lang="en-US" strike="noStrike" noProof="1"/>
           </a:p>
@@ -1365,7 +1379,6 @@
               <a:rPr lang="en-US" strike="noStrike" noProof="1" smtClean="0"/>
               <a:t>Click to edit Master text styles</a:t>
             </a:r>
-            <a:endParaRPr lang="en-US" strike="noStrike" noProof="1" smtClean="0"/>
           </a:p>
           <a:p>
             <a:pPr lvl="1" fontAlgn="base"/>
@@ -1373,7 +1386,6 @@
               <a:rPr lang="en-US" strike="noStrike" noProof="1" smtClean="0"/>
               <a:t>Second level</a:t>
             </a:r>
-            <a:endParaRPr lang="en-US" strike="noStrike" noProof="1" smtClean="0"/>
           </a:p>
           <a:p>
             <a:pPr lvl="2" fontAlgn="base"/>
@@ -1381,7 +1393,6 @@
               <a:rPr lang="en-US" strike="noStrike" noProof="1" smtClean="0"/>
               <a:t>Third level</a:t>
             </a:r>
-            <a:endParaRPr lang="en-US" strike="noStrike" noProof="1" smtClean="0"/>
           </a:p>
           <a:p>
             <a:pPr lvl="3" fontAlgn="base"/>
@@ -1389,7 +1400,6 @@
               <a:rPr lang="en-US" strike="noStrike" noProof="1" smtClean="0"/>
               <a:t>Fourth level</a:t>
             </a:r>
-            <a:endParaRPr lang="en-US" strike="noStrike" noProof="1" smtClean="0"/>
           </a:p>
           <a:p>
             <a:pPr lvl="4" fontAlgn="base"/>
@@ -1427,9 +1437,11 @@
         </p:spPr>
         <p:txBody>
           <a:bodyPr vert="horz" wrap="square" lIns="91440" tIns="45720" rIns="91440" bIns="45720" numCol="1" anchor="t" anchorCtr="0" compatLnSpc="1"/>
+          <a:lstStyle/>
           <a:p>
             <a:fld id="{760FBDFE-C587-4B4C-A407-44438C67B59E}" type="datetimeFigureOut">
               <a:rPr lang="zh-CN" altLang="en-US" smtClean="0"/>
+              <a:t>2020/6/11</a:t>
             </a:fld>
             <a:endParaRPr lang="zh-CN" altLang="en-US"/>
           </a:p>
@@ -1453,6 +1465,7 @@
         </p:spPr>
         <p:txBody>
           <a:bodyPr/>
+          <a:lstStyle/>
           <a:p>
             <a:endParaRPr lang="zh-CN" altLang="en-US"/>
           </a:p>
@@ -1484,9 +1497,11 @@
         </p:spPr>
         <p:txBody>
           <a:bodyPr vert="horz" wrap="square" lIns="91440" tIns="45720" rIns="91440" bIns="45720" numCol="1" anchor="t" anchorCtr="0" compatLnSpc="1"/>
+          <a:lstStyle/>
           <a:p>
             <a:fld id="{49AE70B2-8BF9-45C0-BB95-33D1B9D3A854}" type="slidenum">
               <a:rPr lang="zh-CN" altLang="en-US" smtClean="0"/>
+              <a:t>‹#›</a:t>
             </a:fld>
             <a:endParaRPr lang="zh-CN" altLang="en-US"/>
           </a:p>
@@ -1735,7 +1750,6 @@
               <a:rPr lang="en-US" strike="noStrike" noProof="1" smtClean="0"/>
               <a:t>Click to edit Master text styles</a:t>
             </a:r>
-            <a:endParaRPr lang="en-US" strike="noStrike" noProof="1" smtClean="0"/>
           </a:p>
           <a:p>
             <a:pPr lvl="1" fontAlgn="base"/>
@@ -1743,7 +1757,6 @@
               <a:rPr lang="en-US" strike="noStrike" noProof="1" smtClean="0"/>
               <a:t>Second level</a:t>
             </a:r>
-            <a:endParaRPr lang="en-US" strike="noStrike" noProof="1" smtClean="0"/>
           </a:p>
           <a:p>
             <a:pPr lvl="2" fontAlgn="base"/>
@@ -1751,7 +1764,6 @@
               <a:rPr lang="en-US" strike="noStrike" noProof="1" smtClean="0"/>
               <a:t>Third level</a:t>
             </a:r>
-            <a:endParaRPr lang="en-US" strike="noStrike" noProof="1" smtClean="0"/>
           </a:p>
           <a:p>
             <a:pPr lvl="3" fontAlgn="base"/>
@@ -1759,7 +1771,6 @@
               <a:rPr lang="en-US" strike="noStrike" noProof="1" smtClean="0"/>
               <a:t>Fourth level</a:t>
             </a:r>
-            <a:endParaRPr lang="en-US" strike="noStrike" noProof="1" smtClean="0"/>
           </a:p>
           <a:p>
             <a:pPr lvl="4" fontAlgn="base"/>
@@ -1797,9 +1808,11 @@
         </p:spPr>
         <p:txBody>
           <a:bodyPr vert="horz" wrap="square" lIns="91440" tIns="45720" rIns="91440" bIns="45720" numCol="1" anchor="t" anchorCtr="0" compatLnSpc="1"/>
+          <a:lstStyle/>
           <a:p>
             <a:fld id="{760FBDFE-C587-4B4C-A407-44438C67B59E}" type="datetimeFigureOut">
               <a:rPr lang="zh-CN" altLang="en-US" smtClean="0"/>
+              <a:t>2020/6/11</a:t>
             </a:fld>
             <a:endParaRPr lang="zh-CN" altLang="en-US"/>
           </a:p>
@@ -1831,9 +1844,11 @@
         </p:spPr>
         <p:txBody>
           <a:bodyPr vert="horz" wrap="square" lIns="91440" tIns="45720" rIns="91440" bIns="45720" numCol="1" anchor="t" anchorCtr="0" compatLnSpc="1"/>
+          <a:lstStyle/>
           <a:p>
             <a:fld id="{49AE70B2-8BF9-45C0-BB95-33D1B9D3A854}" type="slidenum">
               <a:rPr lang="zh-CN" altLang="en-US" smtClean="0"/>
+              <a:t>‹#›</a:t>
             </a:fld>
             <a:endParaRPr lang="zh-CN" altLang="en-US"/>
           </a:p>
@@ -1968,7 +1983,6 @@
               <a:rPr lang="en-US" strike="noStrike" noProof="1" smtClean="0"/>
               <a:t>Click to edit Master text styles</a:t>
             </a:r>
-            <a:endParaRPr lang="en-US" strike="noStrike" noProof="1" smtClean="0"/>
           </a:p>
         </p:txBody>
       </p:sp>
@@ -1998,9 +2012,11 @@
         </p:spPr>
         <p:txBody>
           <a:bodyPr vert="horz" wrap="square" lIns="91440" tIns="45720" rIns="91440" bIns="45720" numCol="1" anchor="t" anchorCtr="0" compatLnSpc="1"/>
+          <a:lstStyle/>
           <a:p>
             <a:fld id="{760FBDFE-C587-4B4C-A407-44438C67B59E}" type="datetimeFigureOut">
               <a:rPr lang="zh-CN" altLang="en-US" smtClean="0"/>
+              <a:t>2020/6/11</a:t>
             </a:fld>
             <a:endParaRPr lang="zh-CN" altLang="en-US"/>
           </a:p>
@@ -2024,6 +2040,7 @@
         </p:spPr>
         <p:txBody>
           <a:bodyPr/>
+          <a:lstStyle/>
           <a:p>
             <a:endParaRPr lang="zh-CN" altLang="en-US"/>
           </a:p>
@@ -2055,9 +2072,11 @@
         </p:spPr>
         <p:txBody>
           <a:bodyPr vert="horz" wrap="square" lIns="91440" tIns="45720" rIns="91440" bIns="45720" numCol="1" anchor="t" anchorCtr="0" compatLnSpc="1"/>
+          <a:lstStyle/>
           <a:p>
             <a:fld id="{49AE70B2-8BF9-45C0-BB95-33D1B9D3A854}" type="slidenum">
               <a:rPr lang="zh-CN" altLang="en-US" smtClean="0"/>
+              <a:t>‹#›</a:t>
             </a:fld>
             <a:endParaRPr lang="zh-CN" altLang="en-US"/>
           </a:p>
@@ -2146,7 +2165,6 @@
               <a:rPr lang="en-US" strike="noStrike" noProof="1" smtClean="0"/>
               <a:t>Click to edit Master text styles</a:t>
             </a:r>
-            <a:endParaRPr lang="en-US" strike="noStrike" noProof="1" smtClean="0"/>
           </a:p>
           <a:p>
             <a:pPr lvl="1" fontAlgn="base"/>
@@ -2154,7 +2172,6 @@
               <a:rPr lang="en-US" strike="noStrike" noProof="1" smtClean="0"/>
               <a:t>Second level</a:t>
             </a:r>
-            <a:endParaRPr lang="en-US" strike="noStrike" noProof="1" smtClean="0"/>
           </a:p>
           <a:p>
             <a:pPr lvl="2" fontAlgn="base"/>
@@ -2162,7 +2179,6 @@
               <a:rPr lang="en-US" strike="noStrike" noProof="1" smtClean="0"/>
               <a:t>Third level</a:t>
             </a:r>
-            <a:endParaRPr lang="en-US" strike="noStrike" noProof="1" smtClean="0"/>
           </a:p>
           <a:p>
             <a:pPr lvl="3" fontAlgn="base"/>
@@ -2170,7 +2186,6 @@
               <a:rPr lang="en-US" strike="noStrike" noProof="1" smtClean="0"/>
               <a:t>Fourth level</a:t>
             </a:r>
-            <a:endParaRPr lang="en-US" strike="noStrike" noProof="1" smtClean="0"/>
           </a:p>
           <a:p>
             <a:pPr lvl="4" fontAlgn="base"/>
@@ -2207,7 +2222,6 @@
               <a:rPr lang="en-US" strike="noStrike" noProof="1" smtClean="0"/>
               <a:t>Click to edit Master text styles</a:t>
             </a:r>
-            <a:endParaRPr lang="en-US" strike="noStrike" noProof="1" smtClean="0"/>
           </a:p>
           <a:p>
             <a:pPr lvl="1" fontAlgn="base"/>
@@ -2215,7 +2229,6 @@
               <a:rPr lang="en-US" strike="noStrike" noProof="1" smtClean="0"/>
               <a:t>Second level</a:t>
             </a:r>
-            <a:endParaRPr lang="en-US" strike="noStrike" noProof="1" smtClean="0"/>
           </a:p>
           <a:p>
             <a:pPr lvl="2" fontAlgn="base"/>
@@ -2223,7 +2236,6 @@
               <a:rPr lang="en-US" strike="noStrike" noProof="1" smtClean="0"/>
               <a:t>Third level</a:t>
             </a:r>
-            <a:endParaRPr lang="en-US" strike="noStrike" noProof="1" smtClean="0"/>
           </a:p>
           <a:p>
             <a:pPr lvl="3" fontAlgn="base"/>
@@ -2231,7 +2243,6 @@
               <a:rPr lang="en-US" strike="noStrike" noProof="1" smtClean="0"/>
               <a:t>Fourth level</a:t>
             </a:r>
-            <a:endParaRPr lang="en-US" strike="noStrike" noProof="1" smtClean="0"/>
           </a:p>
           <a:p>
             <a:pPr lvl="4" fontAlgn="base"/>
@@ -2269,9 +2280,11 @@
         </p:spPr>
         <p:txBody>
           <a:bodyPr vert="horz" wrap="square" lIns="91440" tIns="45720" rIns="91440" bIns="45720" numCol="1" anchor="t" anchorCtr="0" compatLnSpc="1"/>
+          <a:lstStyle/>
           <a:p>
             <a:fld id="{760FBDFE-C587-4B4C-A407-44438C67B59E}" type="datetimeFigureOut">
               <a:rPr lang="zh-CN" altLang="en-US" smtClean="0"/>
+              <a:t>2020/6/11</a:t>
             </a:fld>
             <a:endParaRPr lang="zh-CN" altLang="en-US"/>
           </a:p>
@@ -2295,6 +2308,7 @@
         </p:spPr>
         <p:txBody>
           <a:bodyPr/>
+          <a:lstStyle/>
           <a:p>
             <a:endParaRPr lang="zh-CN" altLang="en-US"/>
           </a:p>
@@ -2326,9 +2340,11 @@
         </p:spPr>
         <p:txBody>
           <a:bodyPr vert="horz" wrap="square" lIns="91440" tIns="45720" rIns="91440" bIns="45720" numCol="1" anchor="t" anchorCtr="0" compatLnSpc="1"/>
+          <a:lstStyle/>
           <a:p>
             <a:fld id="{49AE70B2-8BF9-45C0-BB95-33D1B9D3A854}" type="slidenum">
               <a:rPr lang="zh-CN" altLang="en-US" smtClean="0"/>
+              <a:t>‹#›</a:t>
             </a:fld>
             <a:endParaRPr lang="zh-CN" altLang="en-US"/>
           </a:p>
@@ -2459,7 +2475,6 @@
               <a:rPr lang="en-US" strike="noStrike" noProof="1" smtClean="0"/>
               <a:t>Click to edit Master text styles</a:t>
             </a:r>
-            <a:endParaRPr lang="en-US" strike="noStrike" noProof="1" smtClean="0"/>
           </a:p>
         </p:txBody>
       </p:sp>
@@ -2488,7 +2503,6 @@
               <a:rPr lang="en-US" strike="noStrike" noProof="1" smtClean="0"/>
               <a:t>Click to edit Master text styles</a:t>
             </a:r>
-            <a:endParaRPr lang="en-US" strike="noStrike" noProof="1" smtClean="0"/>
           </a:p>
           <a:p>
             <a:pPr lvl="1" fontAlgn="base"/>
@@ -2496,7 +2510,6 @@
               <a:rPr lang="en-US" strike="noStrike" noProof="1" smtClean="0"/>
               <a:t>Second level</a:t>
             </a:r>
-            <a:endParaRPr lang="en-US" strike="noStrike" noProof="1" smtClean="0"/>
           </a:p>
           <a:p>
             <a:pPr lvl="2" fontAlgn="base"/>
@@ -2504,7 +2517,6 @@
               <a:rPr lang="en-US" strike="noStrike" noProof="1" smtClean="0"/>
               <a:t>Third level</a:t>
             </a:r>
-            <a:endParaRPr lang="en-US" strike="noStrike" noProof="1" smtClean="0"/>
           </a:p>
           <a:p>
             <a:pPr lvl="3" fontAlgn="base"/>
@@ -2512,7 +2524,6 @@
               <a:rPr lang="en-US" strike="noStrike" noProof="1" smtClean="0"/>
               <a:t>Fourth level</a:t>
             </a:r>
-            <a:endParaRPr lang="en-US" strike="noStrike" noProof="1" smtClean="0"/>
           </a:p>
           <a:p>
             <a:pPr lvl="4" fontAlgn="base"/>
@@ -2586,7 +2597,6 @@
               <a:rPr lang="en-US" strike="noStrike" noProof="1" smtClean="0"/>
               <a:t>Click to edit Master text styles</a:t>
             </a:r>
-            <a:endParaRPr lang="en-US" strike="noStrike" noProof="1" smtClean="0"/>
           </a:p>
         </p:txBody>
       </p:sp>
@@ -2615,7 +2625,6 @@
               <a:rPr lang="en-US" strike="noStrike" noProof="1" smtClean="0"/>
               <a:t>Click to edit Master text styles</a:t>
             </a:r>
-            <a:endParaRPr lang="en-US" strike="noStrike" noProof="1" smtClean="0"/>
           </a:p>
           <a:p>
             <a:pPr lvl="1" fontAlgn="base"/>
@@ -2623,7 +2632,6 @@
               <a:rPr lang="en-US" strike="noStrike" noProof="1" smtClean="0"/>
               <a:t>Second level</a:t>
             </a:r>
-            <a:endParaRPr lang="en-US" strike="noStrike" noProof="1" smtClean="0"/>
           </a:p>
           <a:p>
             <a:pPr lvl="2" fontAlgn="base"/>
@@ -2631,7 +2639,6 @@
               <a:rPr lang="en-US" strike="noStrike" noProof="1" smtClean="0"/>
               <a:t>Third level</a:t>
             </a:r>
-            <a:endParaRPr lang="en-US" strike="noStrike" noProof="1" smtClean="0"/>
           </a:p>
           <a:p>
             <a:pPr lvl="3" fontAlgn="base"/>
@@ -2639,7 +2646,6 @@
               <a:rPr lang="en-US" strike="noStrike" noProof="1" smtClean="0"/>
               <a:t>Fourth level</a:t>
             </a:r>
-            <a:endParaRPr lang="en-US" strike="noStrike" noProof="1" smtClean="0"/>
           </a:p>
           <a:p>
             <a:pPr lvl="4" fontAlgn="base"/>
@@ -2677,9 +2683,11 @@
         </p:spPr>
         <p:txBody>
           <a:bodyPr vert="horz" wrap="square" lIns="91440" tIns="45720" rIns="91440" bIns="45720" numCol="1" anchor="t" anchorCtr="0" compatLnSpc="1"/>
+          <a:lstStyle/>
           <a:p>
             <a:fld id="{760FBDFE-C587-4B4C-A407-44438C67B59E}" type="datetimeFigureOut">
               <a:rPr lang="zh-CN" altLang="en-US" smtClean="0"/>
+              <a:t>2020/6/11</a:t>
             </a:fld>
             <a:endParaRPr lang="zh-CN" altLang="en-US"/>
           </a:p>
@@ -2703,6 +2711,7 @@
         </p:spPr>
         <p:txBody>
           <a:bodyPr/>
+          <a:lstStyle/>
           <a:p>
             <a:endParaRPr lang="zh-CN" altLang="en-US"/>
           </a:p>
@@ -2734,9 +2743,11 @@
         </p:spPr>
         <p:txBody>
           <a:bodyPr vert="horz" wrap="square" lIns="91440" tIns="45720" rIns="91440" bIns="45720" numCol="1" anchor="t" anchorCtr="0" compatLnSpc="1"/>
+          <a:lstStyle/>
           <a:p>
             <a:fld id="{49AE70B2-8BF9-45C0-BB95-33D1B9D3A854}" type="slidenum">
               <a:rPr lang="zh-CN" altLang="en-US" smtClean="0"/>
+              <a:t>‹#›</a:t>
             </a:fld>
             <a:endParaRPr lang="zh-CN" altLang="en-US"/>
           </a:p>
@@ -2826,9 +2837,11 @@
         </p:spPr>
         <p:txBody>
           <a:bodyPr vert="horz" wrap="square" lIns="91440" tIns="45720" rIns="91440" bIns="45720" numCol="1" anchor="t" anchorCtr="0" compatLnSpc="1"/>
+          <a:lstStyle/>
           <a:p>
             <a:fld id="{760FBDFE-C587-4B4C-A407-44438C67B59E}" type="datetimeFigureOut">
               <a:rPr lang="zh-CN" altLang="en-US" smtClean="0"/>
+              <a:t>2020/6/11</a:t>
             </a:fld>
             <a:endParaRPr lang="zh-CN" altLang="en-US"/>
           </a:p>
@@ -2852,6 +2865,7 @@
         </p:spPr>
         <p:txBody>
           <a:bodyPr/>
+          <a:lstStyle/>
           <a:p>
             <a:endParaRPr lang="zh-CN" altLang="en-US"/>
           </a:p>
@@ -2883,9 +2897,11 @@
         </p:spPr>
         <p:txBody>
           <a:bodyPr vert="horz" wrap="square" lIns="91440" tIns="45720" rIns="91440" bIns="45720" numCol="1" anchor="t" anchorCtr="0" compatLnSpc="1"/>
+          <a:lstStyle/>
           <a:p>
             <a:fld id="{49AE70B2-8BF9-45C0-BB95-33D1B9D3A854}" type="slidenum">
               <a:rPr lang="zh-CN" altLang="en-US" smtClean="0"/>
+              <a:t>‹#›</a:t>
             </a:fld>
             <a:endParaRPr lang="zh-CN" altLang="en-US"/>
           </a:p>
@@ -2951,9 +2967,11 @@
         </p:spPr>
         <p:txBody>
           <a:bodyPr vert="horz" wrap="square" lIns="91440" tIns="45720" rIns="91440" bIns="45720" numCol="1" anchor="t" anchorCtr="0" compatLnSpc="1"/>
+          <a:lstStyle/>
           <a:p>
             <a:fld id="{760FBDFE-C587-4B4C-A407-44438C67B59E}" type="datetimeFigureOut">
               <a:rPr lang="zh-CN" altLang="en-US" smtClean="0"/>
+              <a:t>2020/6/11</a:t>
             </a:fld>
             <a:endParaRPr lang="zh-CN" altLang="en-US"/>
           </a:p>
@@ -2977,6 +2995,7 @@
         </p:spPr>
         <p:txBody>
           <a:bodyPr/>
+          <a:lstStyle/>
           <a:p>
             <a:endParaRPr lang="zh-CN" altLang="en-US"/>
           </a:p>
@@ -3008,9 +3027,11 @@
         </p:spPr>
         <p:txBody>
           <a:bodyPr vert="horz" wrap="square" lIns="91440" tIns="45720" rIns="91440" bIns="45720" numCol="1" anchor="t" anchorCtr="0" compatLnSpc="1"/>
+          <a:lstStyle/>
           <a:p>
             <a:fld id="{49AE70B2-8BF9-45C0-BB95-33D1B9D3A854}" type="slidenum">
               <a:rPr lang="zh-CN" altLang="en-US" smtClean="0"/>
+              <a:t>‹#›</a:t>
             </a:fld>
             <a:endParaRPr lang="zh-CN" altLang="en-US"/>
           </a:p>
@@ -3136,7 +3157,6 @@
               <a:rPr lang="en-US" strike="noStrike" noProof="1" smtClean="0"/>
               <a:t>Click to edit Master text styles</a:t>
             </a:r>
-            <a:endParaRPr lang="en-US" strike="noStrike" noProof="1" smtClean="0"/>
           </a:p>
           <a:p>
             <a:pPr lvl="1" fontAlgn="base"/>
@@ -3144,7 +3164,6 @@
               <a:rPr lang="en-US" strike="noStrike" noProof="1" smtClean="0"/>
               <a:t>Second level</a:t>
             </a:r>
-            <a:endParaRPr lang="en-US" strike="noStrike" noProof="1" smtClean="0"/>
           </a:p>
           <a:p>
             <a:pPr lvl="2" fontAlgn="base"/>
@@ -3152,7 +3171,6 @@
               <a:rPr lang="en-US" strike="noStrike" noProof="1" smtClean="0"/>
               <a:t>Third level</a:t>
             </a:r>
-            <a:endParaRPr lang="en-US" strike="noStrike" noProof="1" smtClean="0"/>
           </a:p>
           <a:p>
             <a:pPr lvl="3" fontAlgn="base"/>
@@ -3160,7 +3178,6 @@
               <a:rPr lang="en-US" strike="noStrike" noProof="1" smtClean="0"/>
               <a:t>Fourth level</a:t>
             </a:r>
-            <a:endParaRPr lang="en-US" strike="noStrike" noProof="1" smtClean="0"/>
           </a:p>
           <a:p>
             <a:pPr lvl="4" fontAlgn="base"/>
@@ -3234,7 +3251,6 @@
               <a:rPr lang="en-US" strike="noStrike" noProof="1" smtClean="0"/>
               <a:t>Click to edit Master text styles</a:t>
             </a:r>
-            <a:endParaRPr lang="en-US" strike="noStrike" noProof="1" smtClean="0"/>
           </a:p>
         </p:txBody>
       </p:sp>
@@ -3264,6 +3280,7 @@
         </p:spPr>
         <p:txBody>
           <a:bodyPr vert="horz" wrap="square" lIns="91440" tIns="45720" rIns="91440" bIns="45720" numCol="1" anchor="t" anchorCtr="0" compatLnSpc="1"/>
+          <a:lstStyle/>
           <a:p>
             <a:pPr lvl="0" fontAlgn="auto"/>
             <a:endParaRPr lang="en-US" strike="noStrike" noProof="1"/>
@@ -3288,6 +3305,7 @@
         </p:spPr>
         <p:txBody>
           <a:bodyPr/>
+          <a:lstStyle/>
           <a:p>
             <a:pPr lvl="0" fontAlgn="auto"/>
             <a:endParaRPr lang="en-US" strike="noStrike" noProof="1"/>
@@ -3320,6 +3338,7 @@
         </p:spPr>
         <p:txBody>
           <a:bodyPr vert="horz" wrap="square" lIns="91440" tIns="45720" rIns="91440" bIns="45720" numCol="1" anchor="t" anchorCtr="0" compatLnSpc="1"/>
+          <a:lstStyle/>
           <a:p>
             <a:pPr lvl="0" fontAlgn="auto"/>
             <a:fld id="{9A0DB2DC-4C9A-4742-B13C-FB6460FD3503}" type="slidenum">
@@ -3328,6 +3347,7 @@
                 <a:ea typeface="+mn-ea"/>
                 <a:cs typeface="+mn-cs"/>
               </a:rPr>
+              <a:t>‹#›</a:t>
             </a:fld>
             <a:endParaRPr lang="en-US" strike="noStrike" noProof="1"/>
           </a:p>
@@ -3552,7 +3572,6 @@
               <a:rPr lang="en-US" strike="noStrike" noProof="1" smtClean="0"/>
               <a:t>Click to edit Master text styles</a:t>
             </a:r>
-            <a:endParaRPr lang="en-US" strike="noStrike" noProof="1" smtClean="0"/>
           </a:p>
         </p:txBody>
       </p:sp>
@@ -3582,9 +3601,11 @@
         </p:spPr>
         <p:txBody>
           <a:bodyPr vert="horz" wrap="square" lIns="91440" tIns="45720" rIns="91440" bIns="45720" numCol="1" anchor="t" anchorCtr="0" compatLnSpc="1"/>
+          <a:lstStyle/>
           <a:p>
             <a:fld id="{9EFD9D74-47D9-4702-A33C-335B63B48DBF}" type="datetimeFigureOut">
               <a:rPr lang="zh-CN" altLang="en-US" smtClean="0"/>
+              <a:t>2020/6/11</a:t>
             </a:fld>
             <a:endParaRPr lang="zh-CN" altLang="en-US" dirty="0"/>
           </a:p>
@@ -3608,6 +3629,7 @@
         </p:spPr>
         <p:txBody>
           <a:bodyPr/>
+          <a:lstStyle/>
           <a:p>
             <a:endParaRPr lang="zh-CN" altLang="en-US" dirty="0"/>
           </a:p>
@@ -3639,9 +3661,11 @@
         </p:spPr>
         <p:txBody>
           <a:bodyPr vert="horz" wrap="square" lIns="91440" tIns="45720" rIns="91440" bIns="45720" numCol="1" anchor="t" anchorCtr="0" compatLnSpc="1"/>
+          <a:lstStyle/>
           <a:p>
             <a:fld id="{FABC47A4-756D-490B-A52F-7D9E2C9FC05F}" type="slidenum">
               <a:rPr lang="zh-CN" altLang="en-US" smtClean="0"/>
+              <a:t>‹#›</a:t>
             </a:fld>
             <a:endParaRPr lang="zh-CN" altLang="en-US"/>
           </a:p>
@@ -3703,7 +3727,14 @@
         <p:cNvGrpSpPr/>
         <p:nvPr/>
       </p:nvGrpSpPr>
-      <p:grpSpPr/>
+      <p:grpSpPr>
+        <a:xfrm>
+          <a:off x="0" y="0"/>
+          <a:ext cx="0" cy="0"/>
+          <a:chOff x="0" y="0"/>
+          <a:chExt cx="0" cy="0"/>
+        </a:xfrm>
+      </p:grpSpPr>
       <p:pic>
         <p:nvPicPr>
           <p:cNvPr id="1026" name="Picture 9"/>
@@ -3713,7 +3744,7 @@
           <p:nvPr/>
         </p:nvPicPr>
         <p:blipFill>
-          <a:blip r:embed="rId12"/>
+          <a:blip r:embed="rId13"/>
           <a:stretch>
             <a:fillRect/>
           </a:stretch>
@@ -3757,13 +3788,13 @@
         </p:spPr>
         <p:txBody>
           <a:bodyPr anchor="ctr" anchorCtr="0"/>
+          <a:lstStyle/>
           <a:p>
             <a:pPr lvl="0"/>
             <a:r>
               <a:rPr lang="en-US" altLang="zh-CN" dirty="0"/>
               <a:t>Click to edit Master title style</a:t>
             </a:r>
-            <a:endParaRPr lang="en-US" altLang="zh-CN" dirty="0"/>
           </a:p>
         </p:txBody>
       </p:sp>
@@ -3792,13 +3823,13 @@
         </p:spPr>
         <p:txBody>
           <a:bodyPr anchor="t" anchorCtr="0"/>
+          <a:lstStyle/>
           <a:p>
             <a:pPr lvl="0"/>
             <a:r>
               <a:rPr lang="en-US" altLang="zh-CN" dirty="0"/>
               <a:t>Click to edit Master text styles</a:t>
             </a:r>
-            <a:endParaRPr lang="en-US" altLang="zh-CN" dirty="0"/>
           </a:p>
           <a:p>
             <a:pPr lvl="1"/>
@@ -3806,7 +3837,6 @@
               <a:rPr lang="en-US" altLang="zh-CN" dirty="0"/>
               <a:t>Second level</a:t>
             </a:r>
-            <a:endParaRPr lang="en-US" altLang="zh-CN" dirty="0"/>
           </a:p>
           <a:p>
             <a:pPr lvl="2"/>
@@ -3814,7 +3844,6 @@
               <a:rPr lang="en-US" altLang="zh-CN" dirty="0"/>
               <a:t>Third level</a:t>
             </a:r>
-            <a:endParaRPr lang="en-US" altLang="zh-CN" dirty="0"/>
           </a:p>
           <a:p>
             <a:pPr lvl="3"/>
@@ -3822,7 +3851,6 @@
               <a:rPr lang="en-US" altLang="zh-CN" dirty="0"/>
               <a:t>Fourth level</a:t>
             </a:r>
-            <a:endParaRPr lang="en-US" altLang="zh-CN" dirty="0"/>
           </a:p>
           <a:p>
             <a:pPr lvl="4"/>
@@ -3830,7 +3858,6 @@
               <a:rPr lang="en-US" altLang="zh-CN" dirty="0"/>
               <a:t>Fifth level</a:t>
             </a:r>
-            <a:endParaRPr lang="en-US" altLang="zh-CN" dirty="0"/>
           </a:p>
         </p:txBody>
       </p:sp>
@@ -3896,6 +3923,7 @@
           <a:p>
             <a:fld id="{760FBDFE-C587-4B4C-A407-44438C67B59E}" type="datetimeFigureOut">
               <a:rPr lang="zh-CN" altLang="en-US" smtClean="0"/>
+              <a:t>2020/6/11</a:t>
             </a:fld>
             <a:endParaRPr lang="zh-CN" altLang="en-US"/>
           </a:p>
@@ -3963,6 +3991,7 @@
           <a:p>
             <a:fld id="{49AE70B2-8BF9-45C0-BB95-33D1B9D3A854}" type="slidenum">
               <a:rPr lang="zh-CN" altLang="en-US" smtClean="0"/>
+              <a:t>‹#›</a:t>
             </a:fld>
             <a:endParaRPr lang="zh-CN" altLang="en-US"/>
           </a:p>
@@ -3977,7 +4006,7 @@
           <p:nvPr/>
         </p:nvPicPr>
         <p:blipFill>
-          <a:blip r:embed="rId13">
+          <a:blip r:embed="rId14">
             <a:clrChange>
               <a:clrFrom>
                 <a:srgbClr val="FFFFFF"/>
@@ -4016,7 +4045,7 @@
           <p:nvPr/>
         </p:nvPicPr>
         <p:blipFill>
-          <a:blip r:embed="rId14">
+          <a:blip r:embed="rId15">
             <a:clrChange>
               <a:clrFrom>
                 <a:srgbClr val="FFFFFF"/>
@@ -4469,7 +4498,14 @@
         <p:cNvGrpSpPr/>
         <p:nvPr/>
       </p:nvGrpSpPr>
-      <p:grpSpPr/>
+      <p:grpSpPr>
+        <a:xfrm>
+          <a:off x="0" y="0"/>
+          <a:ext cx="0" cy="0"/>
+          <a:chOff x="0" y="0"/>
+          <a:chExt cx="0" cy="0"/>
+        </a:xfrm>
+      </p:grpSpPr>
       <p:sp>
         <p:nvSpPr>
           <p:cNvPr id="4" name="Title 3"/>
@@ -4483,12 +4519,12 @@
         <p:spPr/>
         <p:txBody>
           <a:bodyPr/>
+          <a:lstStyle/>
           <a:p>
             <a:r>
               <a:rPr lang="en-US" altLang="en-US"/>
               <a:t>Tutourial for OpenLPT</a:t>
             </a:r>
-            <a:endParaRPr lang="en-US" altLang="en-US"/>
           </a:p>
         </p:txBody>
       </p:sp>
@@ -4505,6 +4541,7 @@
         <p:spPr/>
         <p:txBody>
           <a:bodyPr/>
+          <a:lstStyle/>
           <a:p>
             <a:endParaRPr lang="en-US"/>
           </a:p>
@@ -4527,7 +4564,14 @@
         <p:cNvGrpSpPr/>
         <p:nvPr/>
       </p:nvGrpSpPr>
-      <p:grpSpPr/>
+      <p:grpSpPr>
+        <a:xfrm>
+          <a:off x="0" y="0"/>
+          <a:ext cx="0" cy="0"/>
+          <a:chOff x="0" y="0"/>
+          <a:chExt cx="0" cy="0"/>
+        </a:xfrm>
+      </p:grpSpPr>
       <p:sp>
         <p:nvSpPr>
           <p:cNvPr id="2" name="Title 1"/>
@@ -4541,12 +4585,12 @@
         <p:spPr/>
         <p:txBody>
           <a:bodyPr/>
+          <a:lstStyle/>
           <a:p>
             <a:r>
               <a:rPr lang="" altLang="en-US"/>
               <a:t>Test the code</a:t>
             </a:r>
-            <a:endParaRPr lang="" altLang="en-US"/>
           </a:p>
         </p:txBody>
       </p:sp>
@@ -4563,12 +4607,12 @@
         <p:spPr/>
         <p:txBody>
           <a:bodyPr/>
+          <a:lstStyle/>
           <a:p>
             <a:r>
               <a:rPr lang="" altLang="en-US" sz="2000"/>
               <a:t>Download the sample data named “SD00125” which is in the same folder with “ShakeTheBox”</a:t>
             </a:r>
-            <a:endParaRPr lang="" altLang="en-US" sz="2000"/>
           </a:p>
           <a:p>
             <a:endParaRPr lang="" altLang="en-US" sz="2000"/>
@@ -4578,7 +4622,6 @@
               <a:rPr lang="" altLang="en-US" sz="2000"/>
               <a:t>Under folder SD00125, in iprconfig.txt and trackconfig1.txt, change the [Directory of the sample data] to the current directory that you save “SD00125”</a:t>
             </a:r>
-            <a:endParaRPr lang="" altLang="en-US" sz="2000"/>
           </a:p>
           <a:p>
             <a:endParaRPr lang="" altLang="en-US" sz="2000"/>
@@ -4588,7 +4631,6 @@
               <a:rPr lang="" altLang="en-US" sz="2000"/>
               <a:t>Run cmd, go to the compiled folder (named as “Release” or “Release_windows”) of the ShakeTheBox code, run the code: </a:t>
             </a:r>
-            <a:endParaRPr lang="" altLang="en-US" sz="2000"/>
           </a:p>
           <a:p>
             <a:pPr lvl="1"/>
@@ -4616,7 +4658,6 @@
               <a:rPr lang="" altLang="en-US" sz="1600"/>
               <a:t>]/SD00125/trackingconfig1.txt </a:t>
             </a:r>
-            <a:endParaRPr lang="" altLang="en-US" sz="1600"/>
           </a:p>
           <a:p>
             <a:pPr lvl="1"/>
@@ -4634,19 +4675,7 @@
               <a:rPr lang="en-US" altLang="en-US" sz="1600">
                 <a:sym typeface="+mn-ea"/>
               </a:rPr>
-              <a:t> [your </a:t>
-            </a:r>
-            <a:r>
-              <a:rPr lang="en-US" altLang="en-US" sz="1600">
-                <a:sym typeface="+mn-ea"/>
-              </a:rPr>
-              <a:t>directory of the sample data</a:t>
-            </a:r>
-            <a:r>
-              <a:rPr lang="en-US" altLang="en-US" sz="1600">
-                <a:sym typeface="+mn-ea"/>
-              </a:rPr>
-              <a:t>]/SD00125/trackingconfig1.txt</a:t>
+              <a:t> [your directory of the sample data]/SD00125/trackingconfig1.txt</a:t>
             </a:r>
             <a:endParaRPr lang="" altLang="en-US" sz="1600"/>
           </a:p>
@@ -4656,7 +4685,6 @@
               <a:rPr lang="" altLang="en-US" sz="2000"/>
               <a:t>and key in 0 twice.</a:t>
             </a:r>
-            <a:endParaRPr lang="" altLang="en-US" sz="2000"/>
           </a:p>
           <a:p>
             <a:pPr lvl="0"/>
@@ -4668,7 +4696,6 @@
               <a:rPr lang="" altLang="en-US" sz="2000"/>
               <a:t>And the code will be running automatically.</a:t>
             </a:r>
-            <a:endParaRPr lang="" altLang="en-US" sz="2000"/>
           </a:p>
         </p:txBody>
       </p:sp>
@@ -4689,7 +4716,14 @@
         <p:cNvGrpSpPr/>
         <p:nvPr/>
       </p:nvGrpSpPr>
-      <p:grpSpPr/>
+      <p:grpSpPr>
+        <a:xfrm>
+          <a:off x="0" y="0"/>
+          <a:ext cx="0" cy="0"/>
+          <a:chOff x="0" y="0"/>
+          <a:chExt cx="0" cy="0"/>
+        </a:xfrm>
+      </p:grpSpPr>
       <p:sp>
         <p:nvSpPr>
           <p:cNvPr id="2" name="Title 1"/>
@@ -4703,12 +4737,12 @@
         <p:spPr/>
         <p:txBody>
           <a:bodyPr/>
+          <a:lstStyle/>
           <a:p>
             <a:r>
               <a:rPr lang="" altLang="en-US"/>
               <a:t>Test the code</a:t>
             </a:r>
-            <a:endParaRPr lang="" altLang="en-US"/>
           </a:p>
         </p:txBody>
       </p:sp>
@@ -4725,12 +4759,12 @@
         <p:spPr/>
         <p:txBody>
           <a:bodyPr/>
+          <a:lstStyle/>
           <a:p>
             <a:r>
               <a:rPr lang="" altLang="en-US"/>
               <a:t>The data will be saved in the Tracks folder.</a:t>
             </a:r>
-            <a:endParaRPr lang="" altLang="en-US"/>
           </a:p>
           <a:p>
             <a:endParaRPr lang="" altLang="en-US"/>
@@ -4740,7 +4774,6 @@
               <a:rPr lang="" altLang="en-US"/>
               <a:t>So far, the code can be run normally.</a:t>
             </a:r>
-            <a:endParaRPr lang="" altLang="en-US"/>
           </a:p>
           <a:p>
             <a:endParaRPr lang="" altLang="en-US"/>
@@ -4764,7 +4797,14 @@
         <p:cNvGrpSpPr/>
         <p:nvPr/>
       </p:nvGrpSpPr>
-      <p:grpSpPr/>
+      <p:grpSpPr>
+        <a:xfrm>
+          <a:off x="0" y="0"/>
+          <a:ext cx="0" cy="0"/>
+          <a:chOff x="0" y="0"/>
+          <a:chExt cx="0" cy="0"/>
+        </a:xfrm>
+      </p:grpSpPr>
       <p:sp>
         <p:nvSpPr>
           <p:cNvPr id="2" name="Title 1"/>
@@ -4778,6 +4818,7 @@
         <p:spPr/>
         <p:txBody>
           <a:bodyPr/>
+          <a:lstStyle/>
           <a:p>
             <a:r>
               <a:rPr lang="en-US" altLang="en-US"/>
@@ -4799,7 +4840,6 @@
               <a:rPr lang="en-US" altLang="en-US"/>
               <a:t>)</a:t>
             </a:r>
-            <a:endParaRPr lang="en-US" altLang="en-US"/>
           </a:p>
         </p:txBody>
       </p:sp>
@@ -4816,12 +4856,12 @@
         <p:spPr/>
         <p:txBody>
           <a:bodyPr/>
+          <a:lstStyle/>
           <a:p>
             <a:r>
               <a:rPr lang="en-US" altLang="en-US"/>
               <a:t>Dowload Eclipse from:</a:t>
             </a:r>
-            <a:endParaRPr lang="en-US" altLang="en-US"/>
           </a:p>
           <a:p>
             <a:pPr lvl="1"/>
@@ -4829,7 +4869,6 @@
               <a:rPr lang="en-US" altLang="en-US"/>
               <a:t>https://www.eclipse.org/downloads/</a:t>
             </a:r>
-            <a:endParaRPr lang="en-US" altLang="en-US"/>
           </a:p>
           <a:p>
             <a:pPr lvl="1"/>
@@ -4841,7 +4880,6 @@
               <a:rPr lang="en-US" altLang="en-US" sz="3200"/>
               <a:t>Install Eclipse</a:t>
             </a:r>
-            <a:endParaRPr lang="en-US" altLang="en-US" sz="3200"/>
           </a:p>
           <a:p>
             <a:pPr lvl="1"/>
@@ -4849,7 +4887,6 @@
               <a:rPr lang="en-US" altLang="en-US" sz="2800"/>
               <a:t>select Eclipse IDE for C/C++ developers</a:t>
             </a:r>
-            <a:endParaRPr lang="en-US" altLang="en-US" sz="2800"/>
           </a:p>
           <a:p>
             <a:pPr lvl="1"/>
@@ -4881,7 +4918,14 @@
         <p:cNvGrpSpPr/>
         <p:nvPr/>
       </p:nvGrpSpPr>
-      <p:grpSpPr/>
+      <p:grpSpPr>
+        <a:xfrm>
+          <a:off x="0" y="0"/>
+          <a:ext cx="0" cy="0"/>
+          <a:chOff x="0" y="0"/>
+          <a:chExt cx="0" cy="0"/>
+        </a:xfrm>
+      </p:grpSpPr>
       <p:sp>
         <p:nvSpPr>
           <p:cNvPr id="2" name="Title 1"/>
@@ -4895,12 +4939,12 @@
         <p:spPr/>
         <p:txBody>
           <a:bodyPr/>
+          <a:lstStyle/>
           <a:p>
             <a:r>
               <a:rPr lang="en-US" altLang="en-US"/>
               <a:t>Install git (windows)</a:t>
             </a:r>
-            <a:endParaRPr lang="en-US" altLang="en-US"/>
           </a:p>
         </p:txBody>
       </p:sp>
@@ -4917,12 +4961,12 @@
         <p:spPr/>
         <p:txBody>
           <a:bodyPr/>
+          <a:lstStyle/>
           <a:p>
             <a:r>
               <a:rPr lang="en-US" altLang="en-US"/>
               <a:t>Download git  from:</a:t>
             </a:r>
-            <a:endParaRPr lang="en-US" altLang="en-US"/>
           </a:p>
           <a:p>
             <a:pPr lvl="1"/>
@@ -4930,7 +4974,6 @@
               <a:rPr lang="en-US" altLang="en-US"/>
               <a:t>https://git-scm.com/download/win</a:t>
             </a:r>
-            <a:endParaRPr lang="en-US" altLang="en-US"/>
           </a:p>
           <a:p>
             <a:endParaRPr lang="en-US" altLang="en-US"/>
@@ -4940,7 +4983,6 @@
               <a:rPr lang="en-US" altLang="en-US"/>
               <a:t>Install git</a:t>
             </a:r>
-            <a:endParaRPr lang="en-US" altLang="en-US"/>
           </a:p>
           <a:p>
             <a:pPr lvl="1"/>
@@ -4948,7 +4990,6 @@
               <a:rPr lang="en-US" altLang="en-US"/>
               <a:t>Keep click Next to accept default settings and install git.</a:t>
             </a:r>
-            <a:endParaRPr lang="en-US" altLang="en-US"/>
           </a:p>
           <a:p>
             <a:pPr lvl="1"/>
@@ -4960,7 +5001,6 @@
               <a:rPr lang="" altLang="en-US"/>
               <a:t>For linux system, in the terminal:</a:t>
             </a:r>
-            <a:endParaRPr lang="" altLang="en-US"/>
           </a:p>
           <a:p>
             <a:pPr lvl="1"/>
@@ -4968,7 +5008,6 @@
               <a:rPr lang="" altLang="en-US"/>
               <a:t>sudo apt install git</a:t>
             </a:r>
-            <a:endParaRPr lang="" altLang="en-US"/>
           </a:p>
         </p:txBody>
       </p:sp>
@@ -4989,7 +5028,14 @@
         <p:cNvGrpSpPr/>
         <p:nvPr/>
       </p:nvGrpSpPr>
-      <p:grpSpPr/>
+      <p:grpSpPr>
+        <a:xfrm>
+          <a:off x="0" y="0"/>
+          <a:ext cx="0" cy="0"/>
+          <a:chOff x="0" y="0"/>
+          <a:chExt cx="0" cy="0"/>
+        </a:xfrm>
+      </p:grpSpPr>
       <p:sp>
         <p:nvSpPr>
           <p:cNvPr id="2" name="Title 1"/>
@@ -5003,12 +5049,12 @@
         <p:spPr/>
         <p:txBody>
           <a:bodyPr/>
+          <a:lstStyle/>
           <a:p>
             <a:r>
               <a:rPr lang="en-US" altLang="en-US"/>
               <a:t>Download Code </a:t>
             </a:r>
-            <a:endParaRPr lang="en-US" altLang="en-US"/>
           </a:p>
         </p:txBody>
       </p:sp>
@@ -5025,6 +5071,7 @@
         <p:spPr/>
         <p:txBody>
           <a:bodyPr/>
+          <a:lstStyle/>
           <a:p>
             <a:r>
               <a:rPr lang="en-US" altLang="en-US"/>
@@ -5034,7 +5081,6 @@
               <a:rPr lang="" altLang="en-US"/>
               <a:t>(for windows) or use terminal(for linux)</a:t>
             </a:r>
-            <a:endParaRPr lang="" altLang="en-US"/>
           </a:p>
           <a:p>
             <a:endParaRPr lang="en-US" altLang="en-US"/>
@@ -5044,7 +5090,6 @@
               <a:rPr lang="en-US" altLang="en-US"/>
               <a:t>Use cd to direct to a folder you want to download the code to</a:t>
             </a:r>
-            <a:endParaRPr lang="en-US" altLang="en-US"/>
           </a:p>
           <a:p>
             <a:endParaRPr lang="en-US" altLang="en-US"/>
@@ -5054,7 +5099,6 @@
               <a:rPr lang="en-US" altLang="en-US"/>
               <a:t>Use the following command to download the code</a:t>
             </a:r>
-            <a:endParaRPr lang="en-US" altLang="en-US"/>
           </a:p>
           <a:p>
             <a:pPr lvl="1"/>
@@ -5062,7 +5106,6 @@
               <a:rPr lang="en-US" altLang="en-US"/>
               <a:t>git clone https://github.com/JHU-NI-LAB/OpenLPT_Shake-The-Box.git</a:t>
             </a:r>
-            <a:endParaRPr lang="en-US" altLang="en-US"/>
           </a:p>
           <a:p>
             <a:pPr lvl="1"/>
@@ -5087,7 +5130,14 @@
         <p:cNvGrpSpPr/>
         <p:nvPr/>
       </p:nvGrpSpPr>
-      <p:grpSpPr/>
+      <p:grpSpPr>
+        <a:xfrm>
+          <a:off x="0" y="0"/>
+          <a:ext cx="0" cy="0"/>
+          <a:chOff x="0" y="0"/>
+          <a:chExt cx="0" cy="0"/>
+        </a:xfrm>
+      </p:grpSpPr>
       <p:sp>
         <p:nvSpPr>
           <p:cNvPr id="2" name="Title 1"/>
@@ -5101,12 +5151,12 @@
         <p:spPr/>
         <p:txBody>
           <a:bodyPr/>
+          <a:lstStyle/>
           <a:p>
             <a:r>
               <a:rPr lang="en-US" altLang="en-US"/>
               <a:t>Set up the code in Eclispe</a:t>
             </a:r>
-            <a:endParaRPr lang="en-US" altLang="en-US"/>
           </a:p>
         </p:txBody>
       </p:sp>
@@ -5123,12 +5173,12 @@
         <p:spPr/>
         <p:txBody>
           <a:bodyPr/>
+          <a:lstStyle/>
           <a:p>
             <a:r>
               <a:rPr lang="en-US" altLang="en-US"/>
               <a:t>Lauch Eclispe</a:t>
             </a:r>
-            <a:endParaRPr lang="en-US" altLang="en-US"/>
           </a:p>
           <a:p>
             <a:endParaRPr lang="en-US" altLang="en-US"/>
@@ -5138,7 +5188,6 @@
               <a:rPr lang="en-US" altLang="en-US"/>
               <a:t>File &gt; import &gt; General &gt; Existing projects into workspace</a:t>
             </a:r>
-            <a:endParaRPr lang="en-US" altLang="en-US"/>
           </a:p>
           <a:p>
             <a:endParaRPr lang="en-US" altLang="en-US"/>
@@ -5148,7 +5197,6 @@
               <a:rPr lang="en-US" altLang="en-US"/>
               <a:t>In the pop-up windows, browse the folder you save the code:</a:t>
             </a:r>
-            <a:endParaRPr lang="en-US" altLang="en-US"/>
           </a:p>
           <a:p>
             <a:pPr lvl="1"/>
@@ -5156,7 +5204,6 @@
               <a:rPr lang="en-US" altLang="en-US"/>
               <a:t>[your folder]\OpenLPT_Shake-The-Box\ShakeTheBox</a:t>
             </a:r>
-            <a:endParaRPr lang="en-US" altLang="en-US"/>
           </a:p>
           <a:p>
             <a:pPr lvl="1"/>
@@ -5181,7 +5228,14 @@
         <p:cNvGrpSpPr/>
         <p:nvPr/>
       </p:nvGrpSpPr>
-      <p:grpSpPr/>
+      <p:grpSpPr>
+        <a:xfrm>
+          <a:off x="0" y="0"/>
+          <a:ext cx="0" cy="0"/>
+          <a:chOff x="0" y="0"/>
+          <a:chExt cx="0" cy="0"/>
+        </a:xfrm>
+      </p:grpSpPr>
       <p:sp>
         <p:nvSpPr>
           <p:cNvPr id="2" name="Title 1"/>
@@ -5195,6 +5249,7 @@
         <p:spPr/>
         <p:txBody>
           <a:bodyPr/>
+          <a:lstStyle/>
           <a:p>
             <a:r>
               <a:rPr lang="en-US" altLang="en-US">
@@ -5219,12 +5274,12 @@
         <p:spPr/>
         <p:txBody>
           <a:bodyPr/>
+          <a:lstStyle/>
           <a:p>
             <a:r>
               <a:rPr lang="en-US" altLang="en-US"/>
               <a:t>“ShakeTheBox” will show up in the popup windows, select it and click finish.</a:t>
             </a:r>
-            <a:endParaRPr lang="en-US" altLang="en-US"/>
           </a:p>
           <a:p>
             <a:endParaRPr lang="en-US" altLang="en-US"/>
@@ -5234,7 +5289,6 @@
               <a:rPr lang="en-US" altLang="en-US"/>
               <a:t>close the welcome page, and the code will show up in the workspace.</a:t>
             </a:r>
-            <a:endParaRPr lang="en-US" altLang="en-US"/>
           </a:p>
         </p:txBody>
       </p:sp>
@@ -5255,7 +5309,14 @@
         <p:cNvGrpSpPr/>
         <p:nvPr/>
       </p:nvGrpSpPr>
-      <p:grpSpPr/>
+      <p:grpSpPr>
+        <a:xfrm>
+          <a:off x="0" y="0"/>
+          <a:ext cx="0" cy="0"/>
+          <a:chOff x="0" y="0"/>
+          <a:chExt cx="0" cy="0"/>
+        </a:xfrm>
+      </p:grpSpPr>
       <p:sp>
         <p:nvSpPr>
           <p:cNvPr id="2" name="Title 1"/>
@@ -5269,6 +5330,7 @@
         <p:spPr/>
         <p:txBody>
           <a:bodyPr/>
+          <a:lstStyle/>
           <a:p>
             <a:r>
               <a:rPr lang="en-US" altLang="en-US"/>
@@ -5278,7 +5340,6 @@
               <a:rPr lang="" altLang="en-US"/>
               <a:t>(for windows)</a:t>
             </a:r>
-            <a:endParaRPr lang="" altLang="en-US"/>
           </a:p>
         </p:txBody>
       </p:sp>
@@ -5295,90 +5356,75 @@
         <p:spPr/>
         <p:txBody>
           <a:bodyPr/>
-          <a:p>
-            <a:r>
-              <a:rPr lang="en-US" altLang="en-US" sz="2800"/>
+          <a:lstStyle/>
+          <a:p>
+            <a:r>
+              <a:rPr lang="en-US" altLang="en-US" sz="2800" dirty="0"/>
               <a:t>Windows: </a:t>
             </a:r>
-            <a:endParaRPr lang="en-US" altLang="en-US" sz="2800"/>
           </a:p>
           <a:p>
             <a:pPr lvl="1"/>
             <a:r>
-              <a:rPr lang="en-US" altLang="en-US" sz="2400"/>
-              <a:t>https://cygwin.com/install.html</a:t>
-            </a:r>
-            <a:endParaRPr lang="en-US" altLang="en-US" sz="2400"/>
+              <a:rPr lang="en-US" sz="2400" dirty="0">
+                <a:hlinkClick r:id="rId2"/>
+              </a:rPr>
+              <a:t>https://</a:t>
+            </a:r>
+            <a:r>
+              <a:rPr lang="en-US" sz="2400" dirty="0" smtClean="0">
+                <a:hlinkClick r:id="rId2"/>
+              </a:rPr>
+              <a:t>nuwen.net/mingw.html#install</a:t>
+            </a:r>
+            <a:endParaRPr lang="en-US" sz="2400" dirty="0" smtClean="0"/>
           </a:p>
           <a:p>
             <a:pPr lvl="1"/>
             <a:r>
-              <a:rPr lang="en-US" sz="2400"/>
-              <a:t>download the cygwin installer to a folder (remember this folder)</a:t>
-            </a:r>
-            <a:endParaRPr lang="en-US" sz="2400"/>
+              <a:rPr lang="en-US" sz="2400" dirty="0" smtClean="0"/>
+              <a:t>download </a:t>
+            </a:r>
+            <a:r>
+              <a:rPr lang="en-US" sz="2400" dirty="0"/>
+              <a:t>the </a:t>
+            </a:r>
+            <a:r>
+              <a:rPr lang="en-US" sz="2400" dirty="0" err="1" smtClean="0"/>
+              <a:t>mingw</a:t>
+            </a:r>
+            <a:r>
+              <a:rPr lang="en-US" sz="2400" dirty="0" smtClean="0"/>
+              <a:t> </a:t>
+            </a:r>
+            <a:r>
+              <a:rPr lang="en-US" sz="2400" dirty="0"/>
+              <a:t>installer to a folder (remember this folder)</a:t>
+            </a:r>
           </a:p>
           <a:p>
             <a:pPr lvl="1"/>
             <a:r>
-              <a:rPr lang="en-US" sz="2400"/>
-              <a:t>install cygwin.</a:t>
-            </a:r>
-            <a:endParaRPr lang="en-US" sz="2400"/>
-          </a:p>
-          <a:p>
-            <a:pPr lvl="1"/>
-            <a:r>
-              <a:rPr lang="en-US" sz="2400"/>
-              <a:t>run cmd, and go to the folder you download the cygwin installer, and run the command:</a:t>
-            </a:r>
-            <a:endParaRPr lang="en-US" sz="2400"/>
-          </a:p>
-          <a:p>
-            <a:pPr lvl="2"/>
-            <a:r>
-              <a:rPr lang="en-US" sz="2000"/>
-              <a:t>setup-x86_64.exe -q -P wget -P gcc-g++ -P make -P diffutils -P libmpfr-devel -P libgmp-devel -P libmpc-devel</a:t>
-            </a:r>
-            <a:endParaRPr lang="en-US" sz="2000"/>
-          </a:p>
-          <a:p>
-            <a:pPr lvl="1"/>
-            <a:r>
-              <a:rPr lang="en-US" sz="2000"/>
-              <a:t>to install required packages.</a:t>
-            </a:r>
-            <a:endParaRPr lang="en-US" sz="2000"/>
-          </a:p>
-          <a:p>
-            <a:pPr lvl="1"/>
-            <a:r>
-              <a:rPr lang="en-US" sz="2000">
-                <a:sym typeface="+mn-ea"/>
-              </a:rPr>
-              <a:t>Add C:\cygwin64\bin to your system path.</a:t>
-            </a:r>
-            <a:endParaRPr lang="en-US" sz="2000">
-              <a:sym typeface="+mn-ea"/>
-            </a:endParaRPr>
-          </a:p>
-          <a:p>
-            <a:pPr lvl="2"/>
-            <a:r>
-              <a:rPr lang="en-US" sz="1600"/>
-              <a:t>Search: Edit the system environment variables &gt; Environment Variables &gt; Path &gt; edit &gt; add  “</a:t>
-            </a:r>
-            <a:r>
-              <a:rPr lang="en-US" sz="1600">
-                <a:sym typeface="+mn-ea"/>
-              </a:rPr>
-              <a:t>C:\cygwin64\bin</a:t>
-            </a:r>
-            <a:r>
-              <a:rPr lang="en-US" sz="1600"/>
-              <a:t>”</a:t>
-            </a:r>
-            <a:endParaRPr lang="en-US" sz="1600"/>
+              <a:rPr lang="en-US" sz="2400" dirty="0"/>
+              <a:t>install </a:t>
+            </a:r>
+            <a:r>
+              <a:rPr lang="en-US" sz="2400" dirty="0" err="1" smtClean="0"/>
+              <a:t>mingw</a:t>
+            </a:r>
+            <a:r>
+              <a:rPr lang="en-US" sz="2400" dirty="0"/>
+              <a:t> </a:t>
+            </a:r>
+            <a:r>
+              <a:rPr lang="en-US" sz="2400" dirty="0" smtClean="0"/>
+              <a:t>according to How To Install link on </a:t>
+            </a:r>
+            <a:r>
+              <a:rPr lang="en-US" sz="2400" smtClean="0"/>
+              <a:t>the page.</a:t>
+            </a:r>
+            <a:endParaRPr lang="en-US" sz="2400" dirty="0"/>
           </a:p>
         </p:txBody>
       </p:sp>
@@ -5399,7 +5445,14 @@
         <p:cNvGrpSpPr/>
         <p:nvPr/>
       </p:nvGrpSpPr>
-      <p:grpSpPr/>
+      <p:grpSpPr>
+        <a:xfrm>
+          <a:off x="0" y="0"/>
+          <a:ext cx="0" cy="0"/>
+          <a:chOff x="0" y="0"/>
+          <a:chExt cx="0" cy="0"/>
+        </a:xfrm>
+      </p:grpSpPr>
       <p:sp>
         <p:nvSpPr>
           <p:cNvPr id="2" name="Title 1"/>
@@ -5413,12 +5466,12 @@
         <p:spPr/>
         <p:txBody>
           <a:bodyPr/>
+          <a:lstStyle/>
           <a:p>
             <a:r>
               <a:rPr lang="" altLang="en-US"/>
               <a:t>Install gcc (for linux)</a:t>
             </a:r>
-            <a:endParaRPr lang="" altLang="en-US"/>
           </a:p>
         </p:txBody>
       </p:sp>
@@ -5435,12 +5488,12 @@
         <p:spPr/>
         <p:txBody>
           <a:bodyPr/>
+          <a:lstStyle/>
           <a:p>
             <a:r>
               <a:rPr lang="" altLang="en-US"/>
               <a:t>In terminal:</a:t>
             </a:r>
-            <a:endParaRPr lang="" altLang="en-US"/>
           </a:p>
           <a:p>
             <a:pPr lvl="1"/>
@@ -5448,7 +5501,6 @@
               <a:rPr lang="" altLang="en-US"/>
               <a:t>sudo apt install gcc</a:t>
             </a:r>
-            <a:endParaRPr lang="" altLang="en-US"/>
           </a:p>
         </p:txBody>
       </p:sp>
@@ -5469,7 +5521,14 @@
         <p:cNvGrpSpPr/>
         <p:nvPr/>
       </p:nvGrpSpPr>
-      <p:grpSpPr/>
+      <p:grpSpPr>
+        <a:xfrm>
+          <a:off x="0" y="0"/>
+          <a:ext cx="0" cy="0"/>
+          <a:chOff x="0" y="0"/>
+          <a:chExt cx="0" cy="0"/>
+        </a:xfrm>
+      </p:grpSpPr>
       <p:sp>
         <p:nvSpPr>
           <p:cNvPr id="2" name="Title 1"/>
@@ -5483,12 +5542,12 @@
         <p:spPr/>
         <p:txBody>
           <a:bodyPr/>
+          <a:lstStyle/>
           <a:p>
             <a:r>
               <a:rPr lang="en-US" altLang="en-US"/>
               <a:t>Build the code</a:t>
             </a:r>
-            <a:endParaRPr lang="en-US" altLang="en-US"/>
           </a:p>
         </p:txBody>
       </p:sp>
@@ -5505,12 +5564,12 @@
         <p:spPr/>
         <p:txBody>
           <a:bodyPr/>
+          <a:lstStyle/>
           <a:p>
             <a:r>
               <a:rPr lang="en-US" altLang="en-US"/>
               <a:t>After installing gcc, then the code can be built.</a:t>
             </a:r>
-            <a:endParaRPr lang="en-US" altLang="en-US"/>
           </a:p>
           <a:p>
             <a:pPr lvl="1"/>
@@ -5522,7 +5581,6 @@
               <a:rPr lang="en-US" altLang="en-US"/>
               <a:t> from</a:t>
             </a:r>
-            <a:endParaRPr lang="en-US" altLang="en-US"/>
           </a:p>
           <a:p>
             <a:pPr lvl="1"/>
@@ -5532,9 +5590,6 @@
               </a:rPr>
               <a:t>For windows system, select Release_windows</a:t>
             </a:r>
-            <a:endParaRPr lang="en-US" altLang="en-US">
-              <a:sym typeface="+mn-ea"/>
-            </a:endParaRPr>
           </a:p>
           <a:p>
             <a:pPr lvl="1"/>
@@ -5551,14 +5606,12 @@
               <a:rPr lang="en-US" altLang="en-US"/>
               <a:t> Wait the building process to be finished.</a:t>
             </a:r>
-            <a:endParaRPr lang="en-US" altLang="en-US"/>
           </a:p>
           <a:p>
             <a:r>
               <a:rPr lang="en-US" altLang="en-US"/>
               <a:t>The executable file for ShakeTheBox will show up under the folder:</a:t>
             </a:r>
-            <a:endParaRPr lang="en-US" altLang="en-US"/>
           </a:p>
           <a:p>
             <a:pPr lvl="1"/>
@@ -5566,7 +5619,6 @@
               <a:rPr lang="en-US" altLang="en-US" sz="2400"/>
               <a:t>[folder of the ShakeTheBox code]/Release_windows</a:t>
             </a:r>
-            <a:endParaRPr lang="en-US" altLang="en-US" sz="2400"/>
           </a:p>
           <a:p>
             <a:pPr lvl="1"/>
@@ -5580,9 +5632,6 @@
               </a:rPr>
               <a:t>[folder of the ShakeTheBox code]/Release</a:t>
             </a:r>
-            <a:endParaRPr lang="en-US" altLang="en-US" sz="2400">
-              <a:sym typeface="+mn-ea"/>
-            </a:endParaRPr>
           </a:p>
         </p:txBody>
       </p:sp>
@@ -5595,7 +5644,7 @@
           <p:nvPr/>
         </p:nvPicPr>
         <p:blipFill>
-          <a:blip r:embed="rId1"/>
+          <a:blip r:embed="rId2"/>
           <a:stretch>
             <a:fillRect/>
           </a:stretch>
@@ -5869,6 +5918,8 @@
       </a:bgFillStyleLst>
     </a:fmtScheme>
   </a:themeElements>
+  <a:objectDefaults/>
+  <a:extraClrSchemeLst/>
   <a:extLst>
     <a:ext uri="{05A4C25C-085E-4340-85A3-A5531E510DB2}">
       <thm15:themeFamily xmlns:thm15="http://schemas.microsoft.com/office/thememl/2012/main" name="Office Theme" id="{62F939B6-93AF-4DB8-9C6B-D6C7DFDC589F}" vid="{4A3C46E8-61CC-4603-A589-7422A47A8E4A}"/>
@@ -6128,6 +6179,8 @@
       </a:bgFillStyleLst>
     </a:fmtScheme>
   </a:themeElements>
+  <a:objectDefaults/>
+  <a:extraClrSchemeLst/>
   <a:extLst>
     <a:ext uri="{05A4C25C-085E-4340-85A3-A5531E510DB2}">
       <thm15:themeFamily xmlns:thm15="http://schemas.microsoft.com/office/thememl/2012/main" name="Office Theme" id="{62F939B6-93AF-4DB8-9C6B-D6C7DFDC589F}" vid="{4A3C46E8-61CC-4603-A589-7422A47A8E4A}"/>
@@ -6387,6 +6440,8 @@
       </a:bgFillStyleLst>
     </a:fmtScheme>
   </a:themeElements>
+  <a:objectDefaults/>
+  <a:extraClrSchemeLst/>
   <a:extLst>
     <a:ext uri="{05A4C25C-085E-4340-85A3-A5531E510DB2}">
       <thm15:themeFamily xmlns:thm15="http://schemas.microsoft.com/office/thememl/2012/main" name="Office Theme" id="{62F939B6-93AF-4DB8-9C6B-D6C7DFDC589F}" vid="{4A3C46E8-61CC-4603-A589-7422A47A8E4A}"/>

</xml_diff>